<commit_message>
updated ipynb file code
</commit_message>
<xml_diff>
--- a/Wine Analyze Pres.pptx
+++ b/Wine Analyze Pres.pptx
@@ -5096,7 +5096,7 @@
           <a:p>
             <a:fld id="{FE5B4EDC-59C0-49C7-8ADA-5A781B329E02}" type="datetimeFigureOut">
               <a:rPr lang="en-US"/>
-              <a:t>3/16/2020</a:t>
+              <a:t>3/18/2020</a:t>
             </a:fld>
             <a:endParaRPr/>
           </a:p>
@@ -5261,7 +5261,7 @@
           <a:p>
             <a:fld id="{F2D8D46A-B586-417D-BFBD-8C8FE0AAF762}" type="datetimeFigureOut">
               <a:rPr lang="en-US"/>
-              <a:t>3/16/2020</a:t>
+              <a:t>3/18/2020</a:t>
             </a:fld>
             <a:endParaRPr/>
           </a:p>
@@ -6363,7 +6363,7 @@
           <a:p>
             <a:fld id="{F0DFD029-FB74-4578-B929-F66AA97659CA}" type="datetimeFigureOut">
               <a:rPr lang="en-US"/>
-              <a:t>3/16/2020</a:t>
+              <a:t>3/18/2020</a:t>
             </a:fld>
             <a:endParaRPr/>
           </a:p>
@@ -6561,7 +6561,7 @@
           <a:p>
             <a:fld id="{F0DFD029-FB74-4578-B929-F66AA97659CA}" type="datetimeFigureOut">
               <a:rPr lang="en-US"/>
-              <a:t>3/16/2020</a:t>
+              <a:t>3/18/2020</a:t>
             </a:fld>
             <a:endParaRPr/>
           </a:p>
@@ -6769,7 +6769,7 @@
           <a:p>
             <a:fld id="{F0DFD029-FB74-4578-B929-F66AA97659CA}" type="datetimeFigureOut">
               <a:rPr lang="en-US"/>
-              <a:t>3/16/2020</a:t>
+              <a:t>3/18/2020</a:t>
             </a:fld>
             <a:endParaRPr/>
           </a:p>
@@ -6967,7 +6967,7 @@
           <a:p>
             <a:fld id="{F0DFD029-FB74-4578-B929-F66AA97659CA}" type="datetimeFigureOut">
               <a:rPr lang="en-US"/>
-              <a:t>3/16/2020</a:t>
+              <a:t>3/18/2020</a:t>
             </a:fld>
             <a:endParaRPr/>
           </a:p>
@@ -7399,7 +7399,7 @@
           <a:p>
             <a:fld id="{F0DFD029-FB74-4578-B929-F66AA97659CA}" type="datetimeFigureOut">
               <a:rPr lang="en-US"/>
-              <a:t>3/16/2020</a:t>
+              <a:t>3/18/2020</a:t>
             </a:fld>
             <a:endParaRPr/>
           </a:p>
@@ -7703,7 +7703,7 @@
           <a:p>
             <a:fld id="{F0DFD029-FB74-4578-B929-F66AA97659CA}" type="datetimeFigureOut">
               <a:rPr lang="en-US"/>
-              <a:t>3/16/2020</a:t>
+              <a:t>3/18/2020</a:t>
             </a:fld>
             <a:endParaRPr/>
           </a:p>
@@ -8159,7 +8159,7 @@
           <a:p>
             <a:fld id="{F0DFD029-FB74-4578-B929-F66AA97659CA}" type="datetimeFigureOut">
               <a:rPr lang="en-US"/>
-              <a:t>3/16/2020</a:t>
+              <a:t>3/18/2020</a:t>
             </a:fld>
             <a:endParaRPr/>
           </a:p>
@@ -8289,7 +8289,7 @@
           <a:p>
             <a:fld id="{F0DFD029-FB74-4578-B929-F66AA97659CA}" type="datetimeFigureOut">
               <a:rPr lang="en-US"/>
-              <a:t>3/16/2020</a:t>
+              <a:t>3/18/2020</a:t>
             </a:fld>
             <a:endParaRPr/>
           </a:p>
@@ -8396,7 +8396,7 @@
           <a:p>
             <a:fld id="{F0DFD029-FB74-4578-B929-F66AA97659CA}" type="datetimeFigureOut">
               <a:rPr lang="en-US"/>
-              <a:t>3/16/2020</a:t>
+              <a:t>3/18/2020</a:t>
             </a:fld>
             <a:endParaRPr/>
           </a:p>
@@ -8695,7 +8695,7 @@
           <a:p>
             <a:fld id="{F0DFD029-FB74-4578-B929-F66AA97659CA}" type="datetimeFigureOut">
               <a:rPr lang="en-US"/>
-              <a:t>3/16/2020</a:t>
+              <a:t>3/18/2020</a:t>
             </a:fld>
             <a:endParaRPr/>
           </a:p>
@@ -8983,7 +8983,7 @@
           <a:p>
             <a:fld id="{F0DFD029-FB74-4578-B929-F66AA97659CA}" type="datetimeFigureOut">
               <a:rPr lang="en-US"/>
-              <a:t>3/16/2020</a:t>
+              <a:t>3/18/2020</a:t>
             </a:fld>
             <a:endParaRPr/>
           </a:p>
@@ -9606,7 +9606,7 @@
             <a:fld id="{F0DFD029-FB74-4578-B929-F66AA97659CA}" type="datetimeFigureOut">
               <a:rPr lang="en-US"/>
               <a:pPr/>
-              <a:t>3/16/2020</a:t>
+              <a:t>3/18/2020</a:t>
             </a:fld>
             <a:endParaRPr/>
           </a:p>
@@ -10716,6 +10716,17 @@
               <a:rPr lang="en-US" dirty="0"/>
               <a:t>Analyze the Price in wine by different categories.</a:t>
             </a:r>
+          </a:p>
+          <a:p>
+            <a:r>
+              <a:rPr lang="en-US" dirty="0"/>
+              <a:t>Top wine by it </a:t>
+            </a:r>
+            <a:r>
+              <a:rPr lang="en-US"/>
+              <a:t>brand categories.</a:t>
+            </a:r>
+            <a:endParaRPr lang="en-US" dirty="0"/>
           </a:p>
         </p:txBody>
       </p:sp>
@@ -11177,6 +11188,109 @@
                                           <p:spTgt spid="14">
                                             <p:txEl>
                                               <p:pRg st="3" end="3"/>
+                                            </p:txEl>
+                                          </p:spTgt>
+                                        </p:tgtEl>
+                                        <p:attrNameLst>
+                                          <p:attrName>ppt_y</p:attrName>
+                                        </p:attrNameLst>
+                                      </p:cBhvr>
+                                      <p:tavLst>
+                                        <p:tav tm="0">
+                                          <p:val>
+                                            <p:strVal val="1+#ppt_h/2"/>
+                                          </p:val>
+                                        </p:tav>
+                                        <p:tav tm="100000">
+                                          <p:val>
+                                            <p:strVal val="#ppt_y"/>
+                                          </p:val>
+                                        </p:tav>
+                                      </p:tavLst>
+                                    </p:anim>
+                                  </p:childTnLst>
+                                </p:cTn>
+                              </p:par>
+                            </p:childTnLst>
+                          </p:cTn>
+                        </p:par>
+                      </p:childTnLst>
+                    </p:cTn>
+                  </p:par>
+                  <p:par>
+                    <p:cTn id="31" fill="hold">
+                      <p:stCondLst>
+                        <p:cond delay="indefinite"/>
+                      </p:stCondLst>
+                      <p:childTnLst>
+                        <p:par>
+                          <p:cTn id="32" fill="hold">
+                            <p:stCondLst>
+                              <p:cond delay="0"/>
+                            </p:stCondLst>
+                            <p:childTnLst>
+                              <p:par>
+                                <p:cTn id="33" presetID="2" presetClass="entr" presetSubtype="4" fill="hold" grpId="0" nodeType="clickEffect">
+                                  <p:stCondLst>
+                                    <p:cond delay="0"/>
+                                  </p:stCondLst>
+                                  <p:childTnLst>
+                                    <p:set>
+                                      <p:cBhvr>
+                                        <p:cTn id="34" dur="1" fill="hold">
+                                          <p:stCondLst>
+                                            <p:cond delay="0"/>
+                                          </p:stCondLst>
+                                        </p:cTn>
+                                        <p:tgtEl>
+                                          <p:spTgt spid="14">
+                                            <p:txEl>
+                                              <p:pRg st="4" end="4"/>
+                                            </p:txEl>
+                                          </p:spTgt>
+                                        </p:tgtEl>
+                                        <p:attrNameLst>
+                                          <p:attrName>style.visibility</p:attrName>
+                                        </p:attrNameLst>
+                                      </p:cBhvr>
+                                      <p:to>
+                                        <p:strVal val="visible"/>
+                                      </p:to>
+                                    </p:set>
+                                    <p:anim calcmode="lin" valueType="num">
+                                      <p:cBhvr additive="base">
+                                        <p:cTn id="35" dur="500" fill="hold"/>
+                                        <p:tgtEl>
+                                          <p:spTgt spid="14">
+                                            <p:txEl>
+                                              <p:pRg st="4" end="4"/>
+                                            </p:txEl>
+                                          </p:spTgt>
+                                        </p:tgtEl>
+                                        <p:attrNameLst>
+                                          <p:attrName>ppt_x</p:attrName>
+                                        </p:attrNameLst>
+                                      </p:cBhvr>
+                                      <p:tavLst>
+                                        <p:tav tm="0">
+                                          <p:val>
+                                            <p:strVal val="#ppt_x"/>
+                                          </p:val>
+                                        </p:tav>
+                                        <p:tav tm="100000">
+                                          <p:val>
+                                            <p:strVal val="#ppt_x"/>
+                                          </p:val>
+                                        </p:tav>
+                                      </p:tavLst>
+                                    </p:anim>
+                                    <p:anim calcmode="lin" valueType="num">
+                                      <p:cBhvr additive="base">
+                                        <p:cTn id="36" dur="500" fill="hold"/>
+                                        <p:tgtEl>
+                                          <p:spTgt spid="14">
+                                            <p:txEl>
+                                              <p:pRg st="4" end="4"/>
                                             </p:txEl>
                                           </p:spTgt>
                                         </p:tgtEl>
@@ -13217,15 +13331,6 @@
 </file>
 
 <file path=customXml/item2.xml><?xml version="1.0" encoding="utf-8"?>
-<?mso-contentType ?>
-<FormTemplates xmlns="http://schemas.microsoft.com/sharepoint/v3/contenttype/forms">
-  <Display>DocumentLibraryForm</Display>
-  <Edit>AssetEditForm</Edit>
-  <New>DocumentLibraryForm</New>
-</FormTemplates>
-</file>
-
-<file path=customXml/item3.xml><?xml version="1.0" encoding="utf-8"?>
 <ct:contentTypeSchema xmlns:ct="http://schemas.microsoft.com/office/2006/metadata/contentType" xmlns:ma="http://schemas.microsoft.com/office/2006/metadata/properties/metaAttributes" ct:_="" ma:_="" ma:contentTypeName="TemplateFile" ma:contentTypeID="0x0101006EDDDB5EE6D98C44930B742096920B300400F5B6D36B3EF94B4E9A635CDF2A18F5B8" ma:contentTypeVersion="72" ma:contentTypeDescription="Create a new document." ma:contentTypeScope="" ma:versionID="a23e56308344d904b51738559c3d67c9">
   <xsd:schema xmlns:xsd="http://www.w3.org/2001/XMLSchema" xmlns:xs="http://www.w3.org/2001/XMLSchema" xmlns:p="http://schemas.microsoft.com/office/2006/metadata/properties" xmlns:ns2="4873beb7-5857-4685-be1f-d57550cc96cc" targetNamespace="http://schemas.microsoft.com/office/2006/metadata/properties" ma:root="true" ma:fieldsID="cd0908cc4600e77bf5da051303e00c8d" ns2:_="">
     <xsd:import namespace="4873beb7-5857-4685-be1f-d57550cc96cc"/>
@@ -14265,6 +14370,15 @@
 </ct:contentTypeSchema>
 </file>
 
+<file path=customXml/item3.xml><?xml version="1.0" encoding="utf-8"?>
+<?mso-contentType ?>
+<FormTemplates xmlns="http://schemas.microsoft.com/sharepoint/v3/contenttype/forms">
+  <Display>DocumentLibraryForm</Display>
+  <Edit>AssetEditForm</Edit>
+  <New>DocumentLibraryForm</New>
+</FormTemplates>
+</file>
+
 <file path=customXml/itemProps1.xml><?xml version="1.0" encoding="utf-8"?>
 <ds:datastoreItem xmlns:ds="http://schemas.openxmlformats.org/officeDocument/2006/customXml" ds:itemID="{60C67BEE-D13F-4BD2-98A5-34D8A0977F68}">
   <ds:schemaRefs>
@@ -14282,14 +14396,6 @@
 </file>
 
 <file path=customXml/itemProps2.xml><?xml version="1.0" encoding="utf-8"?>
-<ds:datastoreItem xmlns:ds="http://schemas.openxmlformats.org/officeDocument/2006/customXml" ds:itemID="{3836F65B-1B07-41EE-A0E8-BC6EF3855225}">
-  <ds:schemaRefs>
-    <ds:schemaRef ds:uri="http://schemas.microsoft.com/sharepoint/v3/contenttype/forms"/>
-  </ds:schemaRefs>
-</ds:datastoreItem>
-</file>
-
-<file path=customXml/itemProps3.xml><?xml version="1.0" encoding="utf-8"?>
 <ds:datastoreItem xmlns:ds="http://schemas.openxmlformats.org/officeDocument/2006/customXml" ds:itemID="{A09BF4D4-EF60-4196-BFC3-9462D607978C}">
   <ds:schemaRefs>
     <ds:schemaRef ds:uri="http://schemas.microsoft.com/office/2006/metadata/contentType"/>
@@ -14305,4 +14411,12 @@
     <ds:schemaRef ds:uri="http://schemas.microsoft.com/internal/obd"/>
   </ds:schemaRefs>
 </ds:datastoreItem>
+</file>
+
+<file path=customXml/itemProps3.xml><?xml version="1.0" encoding="utf-8"?>
+<ds:datastoreItem xmlns:ds="http://schemas.openxmlformats.org/officeDocument/2006/customXml" ds:itemID="{3836F65B-1B07-41EE-A0E8-BC6EF3855225}">
+  <ds:schemaRefs>
+    <ds:schemaRef ds:uri="http://schemas.microsoft.com/sharepoint/v3/contenttype/forms"/>
+  </ds:schemaRefs>
+</ds:datastoreItem>
 </file>
</xml_diff>